<commit_message>
App Link un die config file
</commit_message>
<xml_diff>
--- a/Presentation - Business Analytics.pptx
+++ b/Presentation - Business Analytics.pptx
@@ -123,7 +123,7 @@
     <p1510:client id="{22161340-E77A-47F2-8747-0FEF33ED473A}" v="93" dt="2022-12-20T15:04:43.813"/>
     <p1510:client id="{59FC0435-02A8-4E9B-BB26-5A42D2B9F0EE}" v="1" dt="2022-12-21T10:00:06.854"/>
     <p1510:client id="{936338F3-4A6B-4641-9579-ADBC6C3E8616}" v="30" dt="2022-12-21T09:56:23.912"/>
-    <p1510:client id="{C12EE3D1-4BEC-4694-A164-59F713783DFD}" v="24" dt="2022-12-21T12:14:42.743"/>
+    <p1510:client id="{C12EE3D1-4BEC-4694-A164-59F713783DFD}" v="36" dt="2022-12-21T12:26:01.213"/>
   </p1510:revLst>
 </p1510:revInfo>
 </file>
@@ -17515,9 +17515,32 @@
               </a:rPr>
               <a:t>Online Shopper Revenue App</a:t>
             </a:r>
-            <a:endParaRPr lang="de-AT" b="0">
-              <a:ea typeface="Meiryo"/>
-            </a:endParaRPr>
+          </a:p>
+          <a:p>
+            <a:pPr marL="285750" indent="-285750">
+              <a:buFont typeface="Arial" panose="020B0604020202020204" pitchFamily="34" charset="0"/>
+              <a:buChar char="•"/>
+            </a:pPr>
+            <a:r>
+              <a:rPr lang="de-AT" dirty="0" err="1">
+                <a:ea typeface="Meiryo"/>
+              </a:rPr>
+              <a:t>Github</a:t>
+            </a:r>
+            <a:r>
+              <a:rPr lang="de-AT" dirty="0">
+                <a:ea typeface="Meiryo"/>
+              </a:rPr>
+              <a:t>-Link: </a:t>
+            </a:r>
+            <a:r>
+              <a:rPr lang="de-AT" b="0" dirty="0">
+                <a:ea typeface="+mn-lt"/>
+                <a:cs typeface="+mn-lt"/>
+                <a:hlinkClick r:id="rId3"/>
+              </a:rPr>
+              <a:t>https://github.com/LexoDL/Online_Shopper_App</a:t>
+            </a:r>
           </a:p>
         </p:txBody>
       </p:sp>
@@ -17599,7 +17622,7 @@
           <p:nvPr/>
         </p:nvPicPr>
         <p:blipFill>
-          <a:blip r:embed="rId3"/>
+          <a:blip r:embed="rId4"/>
           <a:stretch>
             <a:fillRect/>
           </a:stretch>

</xml_diff>